<commit_message>
Updated the poster with more results and conclusions
Need to add images into the poster along side some more results
</commit_message>
<xml_diff>
--- a/Project Information Files/Poster.pptx
+++ b/Project Information Files/Poster.pptx
@@ -253,7 +253,7 @@
               <a:pPr>
                 <a:defRPr/>
               </a:pPr>
-              <a:t>5/14/2024</a:t>
+              <a:t>5/16/2024</a:t>
             </a:fld>
             <a:endParaRPr lang="en-US"/>
           </a:p>
@@ -763,7 +763,7 @@
               <a:pPr>
                 <a:defRPr/>
               </a:pPr>
-              <a:t>5/14/2024</a:t>
+              <a:t>5/16/2024</a:t>
             </a:fld>
             <a:endParaRPr lang="en-US"/>
           </a:p>
@@ -1569,14 +1569,14 @@
           </a:ln>
           <a:extLst>
             <a:ext uri="{909E8E84-426E-40dd-AFC4-6F175D3DCCD1}">
-              <a14:hiddenFill xmlns:a14="http://schemas.microsoft.com/office/drawing/2010/main" xmlns="">
+              <a14:hiddenFill xmlns="" xmlns:a14="http://schemas.microsoft.com/office/drawing/2010/main">
                 <a:solidFill>
                   <a:srgbClr val="FFFFFF"/>
                 </a:solidFill>
               </a14:hiddenFill>
             </a:ext>
             <a:ext uri="{91240B29-F687-4f45-9708-019B960494DF}">
-              <a14:hiddenLine xmlns:a14="http://schemas.microsoft.com/office/drawing/2010/main" xmlns="" w="9525">
+              <a14:hiddenLine xmlns="" xmlns:a14="http://schemas.microsoft.com/office/drawing/2010/main" w="9525">
                 <a:solidFill>
                   <a:srgbClr val="000000"/>
                 </a:solidFill>
@@ -1628,14 +1628,14 @@
           </a:ln>
           <a:extLst>
             <a:ext uri="{909E8E84-426E-40dd-AFC4-6F175D3DCCD1}">
-              <a14:hiddenFill xmlns:a14="http://schemas.microsoft.com/office/drawing/2010/main" xmlns="">
+              <a14:hiddenFill xmlns="" xmlns:a14="http://schemas.microsoft.com/office/drawing/2010/main">
                 <a:solidFill>
                   <a:srgbClr val="FFFFFF"/>
                 </a:solidFill>
               </a14:hiddenFill>
             </a:ext>
             <a:ext uri="{91240B29-F687-4f45-9708-019B960494DF}">
-              <a14:hiddenLine xmlns:a14="http://schemas.microsoft.com/office/drawing/2010/main" xmlns="" w="9525">
+              <a14:hiddenLine xmlns="" xmlns:a14="http://schemas.microsoft.com/office/drawing/2010/main" w="9525">
                 <a:solidFill>
                   <a:srgbClr val="000000"/>
                 </a:solidFill>
@@ -1735,7 +1735,7 @@
               <a:pPr>
                 <a:defRPr/>
               </a:pPr>
-              <a:t>5/14/2024</a:t>
+              <a:t>5/16/2024</a:t>
             </a:fld>
             <a:endParaRPr lang="en-US"/>
           </a:p>
@@ -2598,6 +2598,30 @@
               <a:t>TurtleBot can be controlled via the ultrasonic sensors</a:t>
             </a:r>
           </a:p>
+          <a:p>
+            <a:pPr marL="285750" indent="-285750">
+              <a:buFont typeface="Arial" panose="020B0604020202020204" pitchFamily="34" charset="0"/>
+              <a:buChar char="•"/>
+            </a:pPr>
+            <a:r>
+              <a:rPr lang="en-US" dirty="0">
+                <a:cs typeface="Helvetica Neue" charset="0"/>
+              </a:rPr>
+              <a:t>Ultrasonic sensors can be used to detect gestures that then influence the TurtleBot’s movement</a:t>
+            </a:r>
+          </a:p>
+          <a:p>
+            <a:pPr marL="285750" indent="-285750">
+              <a:buFont typeface="Arial" panose="020B0604020202020204" pitchFamily="34" charset="0"/>
+              <a:buChar char="•"/>
+            </a:pPr>
+            <a:r>
+              <a:rPr lang="en-US" dirty="0">
+                <a:cs typeface="Helvetica Neue" charset="0"/>
+              </a:rPr>
+              <a:t>The m5core2 can communicate to the TurtleBot via MQTT</a:t>
+            </a:r>
+          </a:p>
         </p:txBody>
       </p:sp>
       <p:sp>
@@ -2638,14 +2662,26 @@
               <a:rPr lang="en-US" dirty="0">
                 <a:cs typeface="Helvetica Neue" charset="0"/>
               </a:rPr>
-              <a:t>TurtleBot can be controlled and moved through </a:t>
-            </a:r>
-            <a:r>
-              <a:rPr lang="en-US">
+              <a:t>Achieved the TurtleBot can be controlled and moved through ultrasonic sensors</a:t>
+            </a:r>
+          </a:p>
+          <a:p>
+            <a:pPr marL="285750" indent="-285750">
+              <a:buFont typeface="Arial" panose="020B0604020202020204" pitchFamily="34" charset="0"/>
+              <a:buChar char="•"/>
+            </a:pPr>
+            <a:r>
+              <a:rPr lang="en-US" dirty="0">
                 <a:cs typeface="Helvetica Neue" charset="0"/>
               </a:rPr>
-              <a:t>ultrasonic sensors</a:t>
-            </a:r>
+              <a:t>Achieved the ultrasonic sensors can be utilized as gesture controllers</a:t>
+            </a:r>
+          </a:p>
+          <a:p>
+            <a:pPr marL="285750" indent="-285750">
+              <a:buFont typeface="Arial" panose="020B0604020202020204" pitchFamily="34" charset="0"/>
+              <a:buChar char="•"/>
+            </a:pPr>
             <a:endParaRPr lang="en-US" dirty="0">
               <a:cs typeface="Helvetica Neue" charset="0"/>
             </a:endParaRPr>

</xml_diff>

<commit_message>
Updates the results and conclusions
Still need to add images to the poster
</commit_message>
<xml_diff>
--- a/Project Information Files/Poster.pptx
+++ b/Project Information Files/Poster.pptx
@@ -2516,7 +2516,7 @@
               <a:rPr lang="en-US" dirty="0">
                 <a:cs typeface="Helvetica Neue" charset="0"/>
               </a:rPr>
-              <a:t>TurtleBot position can be tracked and displayed on m5core2</a:t>
+              <a:t>TurtleBot’s position can be tracked and displayed on the m5core2</a:t>
             </a:r>
           </a:p>
           <a:p>
@@ -2622,6 +2622,18 @@
               <a:t>The m5core2 can communicate to the TurtleBot via MQTT</a:t>
             </a:r>
           </a:p>
+          <a:p>
+            <a:pPr marL="285750" indent="-285750">
+              <a:buFont typeface="Arial" panose="020B0604020202020204" pitchFamily="34" charset="0"/>
+              <a:buChar char="•"/>
+            </a:pPr>
+            <a:r>
+              <a:rPr lang="en-US" dirty="0">
+                <a:cs typeface="Helvetica Neue" charset="0"/>
+              </a:rPr>
+              <a:t>The m5core2 can display the TurtleBot’s position on its display</a:t>
+            </a:r>
+          </a:p>
         </p:txBody>
       </p:sp>
       <p:sp>
@@ -2682,9 +2694,24 @@
               <a:buFont typeface="Arial" panose="020B0604020202020204" pitchFamily="34" charset="0"/>
               <a:buChar char="•"/>
             </a:pPr>
-            <a:endParaRPr lang="en-US" dirty="0">
-              <a:cs typeface="Helvetica Neue" charset="0"/>
-            </a:endParaRPr>
+            <a:r>
+              <a:rPr lang="en-US" dirty="0">
+                <a:cs typeface="Helvetica Neue" charset="0"/>
+              </a:rPr>
+              <a:t>Achieved the TurtleBot’s position can be tracked and displayed on the m5core2</a:t>
+            </a:r>
+          </a:p>
+          <a:p>
+            <a:pPr marL="285750" indent="-285750">
+              <a:buFont typeface="Arial" panose="020B0604020202020204" pitchFamily="34" charset="0"/>
+              <a:buChar char="•"/>
+            </a:pPr>
+            <a:r>
+              <a:rPr lang="en-US" dirty="0">
+                <a:cs typeface="Helvetica Neue" charset="0"/>
+              </a:rPr>
+              <a:t>Achieved that the TurtleBot can communicate with the m5core2 and display its position</a:t>
+            </a:r>
           </a:p>
         </p:txBody>
       </p:sp>

</xml_diff>

<commit_message>
Updates results and conclusion, needs checking for errors
</commit_message>
<xml_diff>
--- a/Project Information Files/Poster.pptx
+++ b/Project Information Files/Poster.pptx
@@ -2528,7 +2528,7 @@
               <a:rPr lang="en-US" dirty="0">
                 <a:cs typeface="Helvetica Neue" charset="0"/>
               </a:rPr>
-              <a:t>TurtleBot utilizes the Lidar to enhance position detection</a:t>
+              <a:t>TurtleBot utilizes the LiDAR to enhance position detection</a:t>
             </a:r>
           </a:p>
           <a:p>
@@ -2595,7 +2595,7 @@
               <a:rPr lang="en-US" dirty="0">
                 <a:cs typeface="Helvetica Neue" charset="0"/>
               </a:rPr>
-              <a:t>TurtleBot can be controlled via the ultrasonic sensors</a:t>
+              <a:t>TurtleBot can be controlled via the ultrasonic sensors.</a:t>
             </a:r>
           </a:p>
           <a:p>
@@ -2607,7 +2607,7 @@
               <a:rPr lang="en-US" dirty="0">
                 <a:cs typeface="Helvetica Neue" charset="0"/>
               </a:rPr>
-              <a:t>Ultrasonic sensors can be used to detect gestures that then influence the TurtleBot’s movement</a:t>
+              <a:t>Ultrasonic sensors can be used to detect gestures.</a:t>
             </a:r>
           </a:p>
           <a:p>
@@ -2619,7 +2619,7 @@
               <a:rPr lang="en-US" dirty="0">
                 <a:cs typeface="Helvetica Neue" charset="0"/>
               </a:rPr>
-              <a:t>The m5core2 can communicate to the TurtleBot via MQTT</a:t>
+              <a:t>The m5core2 can communicate to the TurtleBot via MQTT.</a:t>
             </a:r>
           </a:p>
           <a:p>
@@ -2631,7 +2631,19 @@
               <a:rPr lang="en-US" dirty="0">
                 <a:cs typeface="Helvetica Neue" charset="0"/>
               </a:rPr>
-              <a:t>The m5core2 can display the TurtleBot’s position on its display</a:t>
+              <a:t>The m5core2 can display the TurtleBot’s position on its display.</a:t>
+            </a:r>
+          </a:p>
+          <a:p>
+            <a:pPr marL="285750" indent="-285750">
+              <a:buFont typeface="Arial" panose="020B0604020202020204" pitchFamily="34" charset="0"/>
+              <a:buChar char="•"/>
+            </a:pPr>
+            <a:r>
+              <a:rPr lang="en-US" dirty="0">
+                <a:cs typeface="Helvetica Neue" charset="0"/>
+              </a:rPr>
+              <a:t>The LiDAR can be utilized to track the TurtleBot’s position.</a:t>
             </a:r>
           </a:p>
         </p:txBody>
@@ -2686,7 +2698,7 @@
               <a:rPr lang="en-US" dirty="0">
                 <a:cs typeface="Helvetica Neue" charset="0"/>
               </a:rPr>
-              <a:t>Achieved the ultrasonic sensors can be utilized as gesture controllers</a:t>
+              <a:t>Achieved the TurtleBot’s position can be tracked and displayed on the m5core2</a:t>
             </a:r>
           </a:p>
           <a:p>
@@ -2698,7 +2710,7 @@
               <a:rPr lang="en-US" dirty="0">
                 <a:cs typeface="Helvetica Neue" charset="0"/>
               </a:rPr>
-              <a:t>Achieved the TurtleBot’s position can be tracked and displayed on the m5core2</a:t>
+              <a:t>Achieved that the TurtleBot can communicate with the m5core2 and display its position</a:t>
             </a:r>
           </a:p>
           <a:p>
@@ -2710,7 +2722,7 @@
               <a:rPr lang="en-US" dirty="0">
                 <a:cs typeface="Helvetica Neue" charset="0"/>
               </a:rPr>
-              <a:t>Achieved that the TurtleBot can communicate with the m5core2 and display its position</a:t>
+              <a:t>Achieved that the TurtleBot utilizes the LiDAR to enhance position detection</a:t>
             </a:r>
           </a:p>
         </p:txBody>

</xml_diff>

<commit_message>
Updated poster and added images, needs final checks
</commit_message>
<xml_diff>
--- a/Project Information Files/Poster.pptx
+++ b/Project Information Files/Poster.pptx
@@ -253,7 +253,7 @@
               <a:pPr>
                 <a:defRPr/>
               </a:pPr>
-              <a:t>5/16/2024</a:t>
+              <a:t>5/17/2024</a:t>
             </a:fld>
             <a:endParaRPr lang="en-US"/>
           </a:p>
@@ -763,7 +763,7 @@
               <a:pPr>
                 <a:defRPr/>
               </a:pPr>
-              <a:t>5/16/2024</a:t>
+              <a:t>5/17/2024</a:t>
             </a:fld>
             <a:endParaRPr lang="en-US"/>
           </a:p>
@@ -1569,14 +1569,14 @@
           </a:ln>
           <a:extLst>
             <a:ext uri="{909E8E84-426E-40dd-AFC4-6F175D3DCCD1}">
-              <a14:hiddenFill xmlns="" xmlns:a14="http://schemas.microsoft.com/office/drawing/2010/main">
+              <a14:hiddenFill xmlns:a14="http://schemas.microsoft.com/office/drawing/2010/main" xmlns="">
                 <a:solidFill>
                   <a:srgbClr val="FFFFFF"/>
                 </a:solidFill>
               </a14:hiddenFill>
             </a:ext>
             <a:ext uri="{91240B29-F687-4f45-9708-019B960494DF}">
-              <a14:hiddenLine xmlns="" xmlns:a14="http://schemas.microsoft.com/office/drawing/2010/main" w="9525">
+              <a14:hiddenLine xmlns:a14="http://schemas.microsoft.com/office/drawing/2010/main" xmlns="" w="9525">
                 <a:solidFill>
                   <a:srgbClr val="000000"/>
                 </a:solidFill>
@@ -1628,14 +1628,14 @@
           </a:ln>
           <a:extLst>
             <a:ext uri="{909E8E84-426E-40dd-AFC4-6F175D3DCCD1}">
-              <a14:hiddenFill xmlns="" xmlns:a14="http://schemas.microsoft.com/office/drawing/2010/main">
+              <a14:hiddenFill xmlns:a14="http://schemas.microsoft.com/office/drawing/2010/main" xmlns="">
                 <a:solidFill>
                   <a:srgbClr val="FFFFFF"/>
                 </a:solidFill>
               </a14:hiddenFill>
             </a:ext>
             <a:ext uri="{91240B29-F687-4f45-9708-019B960494DF}">
-              <a14:hiddenLine xmlns="" xmlns:a14="http://schemas.microsoft.com/office/drawing/2010/main" w="9525">
+              <a14:hiddenLine xmlns:a14="http://schemas.microsoft.com/office/drawing/2010/main" xmlns="" w="9525">
                 <a:solidFill>
                   <a:srgbClr val="000000"/>
                 </a:solidFill>
@@ -1735,7 +1735,7 @@
               <a:pPr>
                 <a:defRPr/>
               </a:pPr>
-              <a:t>5/16/2024</a:t>
+              <a:t>5/17/2024</a:t>
             </a:fld>
             <a:endParaRPr lang="en-US"/>
           </a:p>
@@ -2504,7 +2504,7 @@
               <a:rPr lang="en-US" dirty="0">
                 <a:cs typeface="Helvetica Neue" charset="0"/>
               </a:rPr>
-              <a:t>Ultrasonic sensors can be utilized as gesture controllers</a:t>
+              <a:t>Ultrasonic sensors can be utilized as gesture controllers that affect the TurtleBot</a:t>
             </a:r>
           </a:p>
           <a:p>
@@ -2541,18 +2541,6 @@
                 <a:cs typeface="Helvetica Neue" charset="0"/>
               </a:rPr>
               <a:t>TurtleBot can communicate with the m5core2 and display its position</a:t>
-            </a:r>
-          </a:p>
-          <a:p>
-            <a:pPr marL="285750" indent="-285750">
-              <a:buFont typeface="Arial" panose="020B0604020202020204" pitchFamily="34" charset="0"/>
-              <a:buChar char="•"/>
-            </a:pPr>
-            <a:r>
-              <a:rPr lang="en-US" dirty="0">
-                <a:cs typeface="Helvetica Neue" charset="0"/>
-              </a:rPr>
-              <a:t>TurtleBot has some autonomous functionality such as reaching the end of the grid and stopping </a:t>
             </a:r>
           </a:p>
         </p:txBody>
@@ -2646,6 +2634,18 @@
               <a:t>The LiDAR can be utilized to track the TurtleBot’s position.</a:t>
             </a:r>
           </a:p>
+          <a:p>
+            <a:pPr marL="285750" indent="-285750">
+              <a:buFont typeface="Arial" panose="020B0604020202020204" pitchFamily="34" charset="0"/>
+              <a:buChar char="•"/>
+            </a:pPr>
+            <a:r>
+              <a:rPr lang="en-US" dirty="0">
+                <a:cs typeface="Helvetica Neue" charset="0"/>
+              </a:rPr>
+              <a:t>Gestures identified from the ultrasonic sensors cause a movement change in the TurtleBot</a:t>
+            </a:r>
+          </a:p>
         </p:txBody>
       </p:sp>
       <p:sp>
@@ -2725,8 +2725,170 @@
               <a:t>Achieved that the TurtleBot utilizes the LiDAR to enhance position detection</a:t>
             </a:r>
           </a:p>
+          <a:p>
+            <a:pPr marL="285750" indent="-285750">
+              <a:buFont typeface="Arial" panose="020B0604020202020204" pitchFamily="34" charset="0"/>
+              <a:buChar char="•"/>
+            </a:pPr>
+            <a:r>
+              <a:rPr lang="en-US" dirty="0">
+                <a:cs typeface="Helvetica Neue" charset="0"/>
+              </a:rPr>
+              <a:t>Achieved that the ultrasonic sensors can be utilized as gesture controllers that affect the TurtleBot</a:t>
+            </a:r>
+          </a:p>
         </p:txBody>
       </p:sp>
+      <p:pic>
+        <p:nvPicPr>
+          <p:cNvPr id="3" name="Picture 2" descr="A black robot on a wooden surface&#10;&#10;Description automatically generated">
+            <a:extLst>
+              <a:ext uri="{FF2B5EF4-FFF2-40B4-BE49-F238E27FC236}">
+                <a16:creationId xmlns:a16="http://schemas.microsoft.com/office/drawing/2014/main" id="{FDF270D7-8A27-DB7D-73F3-4064C980D396}"/>
+              </a:ext>
+            </a:extLst>
+          </p:cNvPr>
+          <p:cNvPicPr>
+            <a:picLocks noChangeAspect="1"/>
+          </p:cNvPicPr>
+          <p:nvPr/>
+        </p:nvPicPr>
+        <p:blipFill>
+          <a:blip r:embed="rId2"/>
+          <a:stretch>
+            <a:fillRect/>
+          </a:stretch>
+        </p:blipFill>
+        <p:spPr>
+          <a:xfrm>
+            <a:off x="155947" y="5771619"/>
+            <a:ext cx="2016397" cy="2678027"/>
+          </a:xfrm>
+          <a:prstGeom prst="rect">
+            <a:avLst/>
+          </a:prstGeom>
+        </p:spPr>
+      </p:pic>
+      <p:pic>
+        <p:nvPicPr>
+          <p:cNvPr id="5" name="Picture 4" descr="A black plastic object with a black circle on it&#10;&#10;Description automatically generated with medium confidence">
+            <a:extLst>
+              <a:ext uri="{FF2B5EF4-FFF2-40B4-BE49-F238E27FC236}">
+                <a16:creationId xmlns:a16="http://schemas.microsoft.com/office/drawing/2014/main" id="{B6D0AC28-6712-D4E4-063B-2F96E3860D11}"/>
+              </a:ext>
+            </a:extLst>
+          </p:cNvPr>
+          <p:cNvPicPr>
+            <a:picLocks noChangeAspect="1"/>
+          </p:cNvPicPr>
+          <p:nvPr/>
+        </p:nvPicPr>
+        <p:blipFill>
+          <a:blip r:embed="rId3"/>
+          <a:stretch>
+            <a:fillRect/>
+          </a:stretch>
+        </p:blipFill>
+        <p:spPr>
+          <a:xfrm>
+            <a:off x="2294523" y="7246960"/>
+            <a:ext cx="2016877" cy="2678665"/>
+          </a:xfrm>
+          <a:prstGeom prst="rect">
+            <a:avLst/>
+          </a:prstGeom>
+        </p:spPr>
+      </p:pic>
+      <p:pic>
+        <p:nvPicPr>
+          <p:cNvPr id="7" name="Picture 6" descr="A black robot on a wooden surface&#10;&#10;Description automatically generated">
+            <a:extLst>
+              <a:ext uri="{FF2B5EF4-FFF2-40B4-BE49-F238E27FC236}">
+                <a16:creationId xmlns:a16="http://schemas.microsoft.com/office/drawing/2014/main" id="{9FA8820E-12CC-3658-2E54-E513657CE523}"/>
+              </a:ext>
+            </a:extLst>
+          </p:cNvPr>
+          <p:cNvPicPr>
+            <a:picLocks noChangeAspect="1"/>
+          </p:cNvPicPr>
+          <p:nvPr/>
+        </p:nvPicPr>
+        <p:blipFill>
+          <a:blip r:embed="rId4"/>
+          <a:stretch>
+            <a:fillRect/>
+          </a:stretch>
+        </p:blipFill>
+        <p:spPr>
+          <a:xfrm>
+            <a:off x="4696941" y="5518054"/>
+            <a:ext cx="2207317" cy="2931592"/>
+          </a:xfrm>
+          <a:prstGeom prst="rect">
+            <a:avLst/>
+          </a:prstGeom>
+        </p:spPr>
+      </p:pic>
+      <p:pic>
+        <p:nvPicPr>
+          <p:cNvPr id="9" name="Picture 8" descr="A person's hands holding a device&#10;&#10;Description automatically generated">
+            <a:extLst>
+              <a:ext uri="{FF2B5EF4-FFF2-40B4-BE49-F238E27FC236}">
+                <a16:creationId xmlns:a16="http://schemas.microsoft.com/office/drawing/2014/main" id="{8F815C1F-5EA8-CD99-9982-1164B9276401}"/>
+              </a:ext>
+            </a:extLst>
+          </p:cNvPr>
+          <p:cNvPicPr>
+            <a:picLocks noChangeAspect="1"/>
+          </p:cNvPicPr>
+          <p:nvPr/>
+        </p:nvPicPr>
+        <p:blipFill>
+          <a:blip r:embed="rId5"/>
+          <a:stretch>
+            <a:fillRect/>
+          </a:stretch>
+        </p:blipFill>
+        <p:spPr>
+          <a:xfrm>
+            <a:off x="11142663" y="5518054"/>
+            <a:ext cx="2800951" cy="3720013"/>
+          </a:xfrm>
+          <a:prstGeom prst="rect">
+            <a:avLst/>
+          </a:prstGeom>
+        </p:spPr>
+      </p:pic>
+      <p:pic>
+        <p:nvPicPr>
+          <p:cNvPr id="11" name="Picture 10" descr="A person's hands holding a device&#10;&#10;Description automatically generated">
+            <a:extLst>
+              <a:ext uri="{FF2B5EF4-FFF2-40B4-BE49-F238E27FC236}">
+                <a16:creationId xmlns:a16="http://schemas.microsoft.com/office/drawing/2014/main" id="{4B261453-1DE6-8FF8-16A2-9774486EE823}"/>
+              </a:ext>
+            </a:extLst>
+          </p:cNvPr>
+          <p:cNvPicPr>
+            <a:picLocks noChangeAspect="1"/>
+          </p:cNvPicPr>
+          <p:nvPr/>
+        </p:nvPicPr>
+        <p:blipFill>
+          <a:blip r:embed="rId6"/>
+          <a:stretch>
+            <a:fillRect/>
+          </a:stretch>
+        </p:blipFill>
+        <p:spPr>
+          <a:xfrm>
+            <a:off x="7933432" y="6494671"/>
+            <a:ext cx="2697339" cy="3582403"/>
+          </a:xfrm>
+          <a:prstGeom prst="rect">
+            <a:avLst/>
+          </a:prstGeom>
+        </p:spPr>
+      </p:pic>
     </p:spTree>
   </p:cSld>
   <p:clrMapOvr>

</xml_diff>

<commit_message>
Final poster changes, needs to be double checked
</commit_message>
<xml_diff>
--- a/Project Information Files/Poster.pptx
+++ b/Project Information Files/Poster.pptx
@@ -1569,14 +1569,14 @@
           </a:ln>
           <a:extLst>
             <a:ext uri="{909E8E84-426E-40dd-AFC4-6F175D3DCCD1}">
-              <a14:hiddenFill xmlns:a14="http://schemas.microsoft.com/office/drawing/2010/main" xmlns="">
+              <a14:hiddenFill xmlns="" xmlns:a14="http://schemas.microsoft.com/office/drawing/2010/main">
                 <a:solidFill>
                   <a:srgbClr val="FFFFFF"/>
                 </a:solidFill>
               </a14:hiddenFill>
             </a:ext>
             <a:ext uri="{91240B29-F687-4f45-9708-019B960494DF}">
-              <a14:hiddenLine xmlns:a14="http://schemas.microsoft.com/office/drawing/2010/main" xmlns="" w="9525">
+              <a14:hiddenLine xmlns="" xmlns:a14="http://schemas.microsoft.com/office/drawing/2010/main" w="9525">
                 <a:solidFill>
                   <a:srgbClr val="000000"/>
                 </a:solidFill>
@@ -1628,14 +1628,14 @@
           </a:ln>
           <a:extLst>
             <a:ext uri="{909E8E84-426E-40dd-AFC4-6F175D3DCCD1}">
-              <a14:hiddenFill xmlns:a14="http://schemas.microsoft.com/office/drawing/2010/main" xmlns="">
+              <a14:hiddenFill xmlns="" xmlns:a14="http://schemas.microsoft.com/office/drawing/2010/main">
                 <a:solidFill>
                   <a:srgbClr val="FFFFFF"/>
                 </a:solidFill>
               </a14:hiddenFill>
             </a:ext>
             <a:ext uri="{91240B29-F687-4f45-9708-019B960494DF}">
-              <a14:hiddenLine xmlns:a14="http://schemas.microsoft.com/office/drawing/2010/main" xmlns="" w="9525">
+              <a14:hiddenLine xmlns="" xmlns:a14="http://schemas.microsoft.com/office/drawing/2010/main" w="9525">
                 <a:solidFill>
                   <a:srgbClr val="000000"/>
                 </a:solidFill>
@@ -2543,6 +2543,18 @@
               <a:t>TurtleBot can communicate with the m5core2 and display its position</a:t>
             </a:r>
           </a:p>
+          <a:p>
+            <a:pPr marL="285750" indent="-285750">
+              <a:buFont typeface="Arial" panose="020B0604020202020204" pitchFamily="34" charset="0"/>
+              <a:buChar char="•"/>
+            </a:pPr>
+            <a:r>
+              <a:rPr lang="en-US" dirty="0">
+                <a:cs typeface="Helvetica Neue" charset="0"/>
+              </a:rPr>
+              <a:t>TurtleBot has some autonomous functionality such as reaching the end of the grid and stopping </a:t>
+            </a:r>
+          </a:p>
         </p:txBody>
       </p:sp>
       <p:sp>
@@ -2646,6 +2658,18 @@
               <a:t>Gestures identified from the ultrasonic sensors cause a movement change in the TurtleBot</a:t>
             </a:r>
           </a:p>
+          <a:p>
+            <a:pPr marL="285750" indent="-285750">
+              <a:buFont typeface="Arial" panose="020B0604020202020204" pitchFamily="34" charset="0"/>
+              <a:buChar char="•"/>
+            </a:pPr>
+            <a:r>
+              <a:rPr lang="en-US" dirty="0">
+                <a:cs typeface="Helvetica Neue" charset="0"/>
+              </a:rPr>
+              <a:t>When reaching the grids edge the TurtleBot stops and turns</a:t>
+            </a:r>
+          </a:p>
         </p:txBody>
       </p:sp>
       <p:sp>
@@ -2736,6 +2760,27 @@
               </a:rPr>
               <a:t>Achieved that the ultrasonic sensors can be utilized as gesture controllers that affect the TurtleBot</a:t>
             </a:r>
+          </a:p>
+          <a:p>
+            <a:pPr marL="285750" indent="-285750">
+              <a:buFont typeface="Arial" panose="020B0604020202020204" pitchFamily="34" charset="0"/>
+              <a:buChar char="•"/>
+            </a:pPr>
+            <a:r>
+              <a:rPr lang="en-US" dirty="0">
+                <a:cs typeface="Helvetica Neue" charset="0"/>
+              </a:rPr>
+              <a:t>Achieved TurtleBot has some autonomous functionality such as reaching the end of the grid and stopping </a:t>
+            </a:r>
+          </a:p>
+          <a:p>
+            <a:pPr marL="285750" indent="-285750">
+              <a:buFont typeface="Arial" panose="020B0604020202020204" pitchFamily="34" charset="0"/>
+              <a:buChar char="•"/>
+            </a:pPr>
+            <a:endParaRPr lang="en-US" dirty="0">
+              <a:cs typeface="Helvetica Neue" charset="0"/>
+            </a:endParaRPr>
           </a:p>
         </p:txBody>
       </p:sp>
@@ -2761,7 +2806,7 @@
         </p:blipFill>
         <p:spPr>
           <a:xfrm>
-            <a:off x="155947" y="5771619"/>
+            <a:off x="319632" y="4690983"/>
             <a:ext cx="2016397" cy="2678027"/>
           </a:xfrm>
           <a:prstGeom prst="rect">
@@ -2791,7 +2836,7 @@
         </p:blipFill>
         <p:spPr>
           <a:xfrm>
-            <a:off x="2294523" y="7246960"/>
+            <a:off x="2455958" y="6959001"/>
             <a:ext cx="2016877" cy="2678665"/>
           </a:xfrm>
           <a:prstGeom prst="rect">
@@ -2821,7 +2866,7 @@
         </p:blipFill>
         <p:spPr>
           <a:xfrm>
-            <a:off x="4696941" y="5518054"/>
+            <a:off x="4732808" y="6029997"/>
             <a:ext cx="2207317" cy="2931592"/>
           </a:xfrm>
           <a:prstGeom prst="rect">
@@ -2851,7 +2896,7 @@
         </p:blipFill>
         <p:spPr>
           <a:xfrm>
-            <a:off x="11142663" y="5518054"/>
+            <a:off x="11142663" y="6438326"/>
             <a:ext cx="2800951" cy="3720013"/>
           </a:xfrm>
           <a:prstGeom prst="rect">
@@ -2881,8 +2926,8 @@
         </p:blipFill>
         <p:spPr>
           <a:xfrm>
-            <a:off x="7933432" y="6494671"/>
-            <a:ext cx="2697339" cy="3582403"/>
+            <a:off x="7549773" y="5939925"/>
+            <a:ext cx="2800951" cy="3720013"/>
           </a:xfrm>
           <a:prstGeom prst="rect">
             <a:avLst/>

</xml_diff>